<commit_message>
finished presentation and LoG
</commit_message>
<xml_diff>
--- a/presentation.pptx
+++ b/presentation.pptx
@@ -69,7 +69,7 @@
         <p:txBody>
           <a:bodyPr/>
           <a:p>
-            <a:fld id="{F24DC9CF-12E8-4E26-B984-F27296EA7F25}" type="slidenum">
+            <a:fld id="{DD803D91-450E-4E84-83C4-62586BAA5091}" type="slidenum">
               <a:t>&lt;#&gt;</a:t>
             </a:fld>
           </a:p>
@@ -263,7 +263,7 @@
         <p:txBody>
           <a:bodyPr/>
           <a:p>
-            <a:fld id="{B016E988-CF90-4038-B68D-F729E83F9CFC}" type="slidenum">
+            <a:fld id="{F5E03F6C-C05C-4CF2-8D32-C0C7DB552C84}" type="slidenum">
               <a:t>&lt;#&gt;</a:t>
             </a:fld>
           </a:p>
@@ -531,7 +531,7 @@
         <p:txBody>
           <a:bodyPr/>
           <a:p>
-            <a:fld id="{AE1A0F91-5694-4529-A84A-C05F4E893DAC}" type="slidenum">
+            <a:fld id="{F2281AD9-E078-423E-AECE-953A777A52A3}" type="slidenum">
               <a:t>&lt;#&gt;</a:t>
             </a:fld>
           </a:p>
@@ -873,7 +873,7 @@
         <p:txBody>
           <a:bodyPr/>
           <a:p>
-            <a:fld id="{2AE5A1C7-7A1E-4C5C-A5C9-46569D045B4B}" type="slidenum">
+            <a:fld id="{C37AD4CF-C2AD-4BA3-B727-3EAE17BA2EE9}" type="slidenum">
               <a:t>&lt;#&gt;</a:t>
             </a:fld>
           </a:p>
@@ -956,7 +956,7 @@
         <p:txBody>
           <a:bodyPr/>
           <a:p>
-            <a:fld id="{9DD02FFE-1996-4E8D-A4BA-0D980D12FFC8}" type="slidenum">
+            <a:fld id="{796EE886-C4B3-4AE6-A777-CD4F36CBBAF8}" type="slidenum">
               <a:t>&lt;#&gt;</a:t>
             </a:fld>
           </a:p>
@@ -1116,7 +1116,7 @@
         <p:txBody>
           <a:bodyPr/>
           <a:p>
-            <a:fld id="{F3A1E840-A735-4AA3-B56B-8DD44A393CFB}" type="slidenum">
+            <a:fld id="{8442CE1F-58CA-4600-A98C-6D903E898186}" type="slidenum">
               <a:t>&lt;#&gt;</a:t>
             </a:fld>
           </a:p>
@@ -1273,7 +1273,7 @@
         <p:txBody>
           <a:bodyPr/>
           <a:p>
-            <a:fld id="{8F169F03-2857-4CC4-92F9-F6A595744294}" type="slidenum">
+            <a:fld id="{7D3100BF-27F7-403B-B7AE-C763A76AAD3F}" type="slidenum">
               <a:t>&lt;#&gt;</a:t>
             </a:fld>
           </a:p>
@@ -1467,7 +1467,7 @@
         <p:txBody>
           <a:bodyPr/>
           <a:p>
-            <a:fld id="{2EA28971-028D-4BEE-A5A0-220DE9004998}" type="slidenum">
+            <a:fld id="{A9E3992A-5B7D-42FC-AF44-B05F2366B045}" type="slidenum">
               <a:t>&lt;#&gt;</a:t>
             </a:fld>
           </a:p>
@@ -1587,7 +1587,7 @@
         <p:txBody>
           <a:bodyPr/>
           <a:p>
-            <a:fld id="{E54C74D1-C51C-4128-B6C0-AA48250B7D42}" type="slidenum">
+            <a:fld id="{2ADC56F5-4D4A-4362-BD15-D1BE71AA2D4F}" type="slidenum">
               <a:t>&lt;#&gt;</a:t>
             </a:fld>
           </a:p>
@@ -1710,7 +1710,7 @@
         <p:txBody>
           <a:bodyPr/>
           <a:p>
-            <a:fld id="{290C4C6E-8454-42A7-9BB7-4F56FB2E16FB}" type="slidenum">
+            <a:fld id="{809C396A-3EC2-4C55-9D45-2C4A21EBE875}" type="slidenum">
               <a:t>&lt;#&gt;</a:t>
             </a:fld>
           </a:p>
@@ -1941,7 +1941,7 @@
         <p:txBody>
           <a:bodyPr/>
           <a:p>
-            <a:fld id="{7C9F9101-4879-4539-916C-F703FBE08F83}" type="slidenum">
+            <a:fld id="{F563FFD8-DA26-4479-897C-CD66D7C2AA74}" type="slidenum">
               <a:t>&lt;#&gt;</a:t>
             </a:fld>
           </a:p>
@@ -2101,7 +2101,7 @@
         <p:txBody>
           <a:bodyPr/>
           <a:p>
-            <a:fld id="{6632E0E1-9A16-413C-A39B-55E523B57817}" type="slidenum">
+            <a:fld id="{77D628F1-066E-45EC-978D-01B66D20D99A}" type="slidenum">
               <a:t>&lt;#&gt;</a:t>
             </a:fld>
           </a:p>
@@ -2332,7 +2332,7 @@
         <p:txBody>
           <a:bodyPr/>
           <a:p>
-            <a:fld id="{35BE6FDE-1E62-42F7-B843-86E0D53A0E98}" type="slidenum">
+            <a:fld id="{59CC7F41-88FF-4B8E-9CE2-6CC17D00E39F}" type="slidenum">
               <a:t>&lt;#&gt;</a:t>
             </a:fld>
           </a:p>
@@ -2563,7 +2563,7 @@
         <p:txBody>
           <a:bodyPr/>
           <a:p>
-            <a:fld id="{63AD12ED-BC6D-4ED6-B3AF-5AE9E22CE34D}" type="slidenum">
+            <a:fld id="{CF54173A-17CC-4229-9308-AAA583A59E00}" type="slidenum">
               <a:t>&lt;#&gt;</a:t>
             </a:fld>
           </a:p>
@@ -2757,7 +2757,7 @@
         <p:txBody>
           <a:bodyPr/>
           <a:p>
-            <a:fld id="{DD38AE71-25C8-43AC-B5C2-0E8A657A0FEB}" type="slidenum">
+            <a:fld id="{5F1B01EB-F117-47A2-9BC0-3F6C1B8D3204}" type="slidenum">
               <a:t>&lt;#&gt;</a:t>
             </a:fld>
           </a:p>
@@ -3025,7 +3025,7 @@
         <p:txBody>
           <a:bodyPr/>
           <a:p>
-            <a:fld id="{1E89FB39-9929-4962-BB1E-BE4C8615C9B1}" type="slidenum">
+            <a:fld id="{3EC2195B-BCAA-4B97-97DF-4DCFD2062734}" type="slidenum">
               <a:t>&lt;#&gt;</a:t>
             </a:fld>
           </a:p>
@@ -3367,7 +3367,7 @@
         <p:txBody>
           <a:bodyPr/>
           <a:p>
-            <a:fld id="{EE46E769-CF14-4276-BD26-CCE031EBDBA9}" type="slidenum">
+            <a:fld id="{80B281C0-A93B-4DCC-A4BF-539330987BAD}" type="slidenum">
               <a:t>&lt;#&gt;</a:t>
             </a:fld>
           </a:p>
@@ -3450,7 +3450,7 @@
         <p:txBody>
           <a:bodyPr/>
           <a:p>
-            <a:fld id="{D0D0D7A7-1159-4492-B803-866AE1AEA661}" type="slidenum">
+            <a:fld id="{A4B3E646-5BA1-4A04-9C14-13A052EB8812}" type="slidenum">
               <a:t>&lt;#&gt;</a:t>
             </a:fld>
           </a:p>
@@ -3610,7 +3610,7 @@
         <p:txBody>
           <a:bodyPr/>
           <a:p>
-            <a:fld id="{C6E2C570-0E04-474F-B30E-F52BCE78537A}" type="slidenum">
+            <a:fld id="{21031292-24A6-4013-AD09-DA9B3E1684B9}" type="slidenum">
               <a:t>&lt;#&gt;</a:t>
             </a:fld>
           </a:p>
@@ -3767,7 +3767,7 @@
         <p:txBody>
           <a:bodyPr/>
           <a:p>
-            <a:fld id="{5D96593D-C530-4ACB-9956-AC219788B743}" type="slidenum">
+            <a:fld id="{328D5D49-668A-49A1-ABA6-36C8997C8D43}" type="slidenum">
               <a:t>&lt;#&gt;</a:t>
             </a:fld>
           </a:p>
@@ -3961,7 +3961,7 @@
         <p:txBody>
           <a:bodyPr/>
           <a:p>
-            <a:fld id="{6D984C53-2DCA-4D09-B2AF-CF736C7FA240}" type="slidenum">
+            <a:fld id="{B03D4291-C62B-4746-833F-71212B50F784}" type="slidenum">
               <a:t>&lt;#&gt;</a:t>
             </a:fld>
           </a:p>
@@ -4081,7 +4081,7 @@
         <p:txBody>
           <a:bodyPr/>
           <a:p>
-            <a:fld id="{422839F0-314F-4E50-9352-5ECC169757A9}" type="slidenum">
+            <a:fld id="{BB333C83-E323-4851-AA44-7F43754D84C4}" type="slidenum">
               <a:t>&lt;#&gt;</a:t>
             </a:fld>
           </a:p>
@@ -4238,7 +4238,7 @@
         <p:txBody>
           <a:bodyPr/>
           <a:p>
-            <a:fld id="{95524B55-4E71-4C3F-9D81-CD406EEFA349}" type="slidenum">
+            <a:fld id="{61FD6240-6800-40BF-A848-FF4B0A66579C}" type="slidenum">
               <a:t>&lt;#&gt;</a:t>
             </a:fld>
           </a:p>
@@ -4361,7 +4361,7 @@
         <p:txBody>
           <a:bodyPr/>
           <a:p>
-            <a:fld id="{33E4271A-19C3-4416-B3B1-ACE8CCCFE39A}" type="slidenum">
+            <a:fld id="{BC92ED37-7252-474A-BBE2-3579589E15E4}" type="slidenum">
               <a:t>&lt;#&gt;</a:t>
             </a:fld>
           </a:p>
@@ -4592,7 +4592,7 @@
         <p:txBody>
           <a:bodyPr/>
           <a:p>
-            <a:fld id="{B29F1390-B2E5-4608-B169-42E0EA442D3D}" type="slidenum">
+            <a:fld id="{24F87C19-B036-4900-B409-8A4AB9D2FC9D}" type="slidenum">
               <a:t>&lt;#&gt;</a:t>
             </a:fld>
           </a:p>
@@ -4823,7 +4823,7 @@
         <p:txBody>
           <a:bodyPr/>
           <a:p>
-            <a:fld id="{C52BAB76-2298-4228-848B-7EBFFD35C8FD}" type="slidenum">
+            <a:fld id="{73397970-1C28-48CB-A1B9-148D0A8E2CD6}" type="slidenum">
               <a:t>&lt;#&gt;</a:t>
             </a:fld>
           </a:p>
@@ -5054,7 +5054,7 @@
         <p:txBody>
           <a:bodyPr/>
           <a:p>
-            <a:fld id="{F9418480-B5A4-42F6-AD38-36F2AA7432EC}" type="slidenum">
+            <a:fld id="{38D2A188-1009-47AB-9AA8-8CFC46E4B954}" type="slidenum">
               <a:t>&lt;#&gt;</a:t>
             </a:fld>
           </a:p>
@@ -5248,7 +5248,7 @@
         <p:txBody>
           <a:bodyPr/>
           <a:p>
-            <a:fld id="{FA6C052F-BC8B-4F3C-9B48-21ED45B1CEAC}" type="slidenum">
+            <a:fld id="{58B8AEFF-8F71-4610-9EDC-3BDDCEBB4D6C}" type="slidenum">
               <a:t>&lt;#&gt;</a:t>
             </a:fld>
           </a:p>
@@ -5516,7 +5516,7 @@
         <p:txBody>
           <a:bodyPr/>
           <a:p>
-            <a:fld id="{4FE89DC5-5090-44A8-BE8B-2308C01156EF}" type="slidenum">
+            <a:fld id="{0F8CEF9D-D11C-47C5-AD2E-4A4301C78D86}" type="slidenum">
               <a:t>&lt;#&gt;</a:t>
             </a:fld>
           </a:p>
@@ -5858,7 +5858,7 @@
         <p:txBody>
           <a:bodyPr/>
           <a:p>
-            <a:fld id="{72183F05-9CEF-4074-8448-EA1B355155BC}" type="slidenum">
+            <a:fld id="{EF82A54D-B70D-4DAA-B203-EC8399096A34}" type="slidenum">
               <a:t>&lt;#&gt;</a:t>
             </a:fld>
           </a:p>
@@ -6052,7 +6052,7 @@
         <p:txBody>
           <a:bodyPr/>
           <a:p>
-            <a:fld id="{E3D0252A-A72A-44B6-B898-D8562ECCCD0B}" type="slidenum">
+            <a:fld id="{072D0E66-C94A-47F1-A584-B05FC03C5D1E}" type="slidenum">
               <a:t>&lt;#&gt;</a:t>
             </a:fld>
           </a:p>
@@ -6172,7 +6172,7 @@
         <p:txBody>
           <a:bodyPr/>
           <a:p>
-            <a:fld id="{E7E1A722-E158-416A-895B-388407388E2B}" type="slidenum">
+            <a:fld id="{05CE5010-B314-48F1-8CFC-5C4C9E561F32}" type="slidenum">
               <a:t>&lt;#&gt;</a:t>
             </a:fld>
           </a:p>
@@ -6295,7 +6295,7 @@
         <p:txBody>
           <a:bodyPr/>
           <a:p>
-            <a:fld id="{341DDF2D-C279-4DF0-AD3D-2D4C3EE2DD39}" type="slidenum">
+            <a:fld id="{878DC08B-FD00-4C49-BF94-8B0F457241DD}" type="slidenum">
               <a:t>&lt;#&gt;</a:t>
             </a:fld>
           </a:p>
@@ -6526,7 +6526,7 @@
         <p:txBody>
           <a:bodyPr/>
           <a:p>
-            <a:fld id="{0EBE2A28-0EE0-4E8A-AE0A-B25804C7FB69}" type="slidenum">
+            <a:fld id="{B579DE49-FE87-466F-92E1-7DE581D21CFF}" type="slidenum">
               <a:t>&lt;#&gt;</a:t>
             </a:fld>
           </a:p>
@@ -6757,7 +6757,7 @@
         <p:txBody>
           <a:bodyPr/>
           <a:p>
-            <a:fld id="{AFDE3BF3-21EF-4998-9176-8A2D30C86445}" type="slidenum">
+            <a:fld id="{E253C86E-1160-4BB2-BDB4-E5E06BE8B71F}" type="slidenum">
               <a:t>&lt;#&gt;</a:t>
             </a:fld>
           </a:p>
@@ -6988,7 +6988,7 @@
         <p:txBody>
           <a:bodyPr/>
           <a:p>
-            <a:fld id="{5CEF2933-70D8-483F-88A2-8F3283BEA68D}" type="slidenum">
+            <a:fld id="{8284D324-8273-43B8-937A-3197FCE6D7D5}" type="slidenum">
               <a:t>&lt;#&gt;</a:t>
             </a:fld>
           </a:p>
@@ -7502,7 +7502,7 @@
             <a:pPr algn="r">
               <a:buNone/>
             </a:pPr>
-            <a:fld id="{66D3214C-4445-45B9-A500-4BC868645F64}" type="slidenum">
+            <a:fld id="{9D34265E-8AC0-48D8-AD38-B0E8C555CA06}" type="slidenum">
               <a:rPr b="0" lang="en-US" sz="1400" spc="-1" strike="noStrike">
                 <a:solidFill>
                   <a:srgbClr val="ffffff"/>
@@ -8039,7 +8039,7 @@
             <a:pPr algn="r">
               <a:buNone/>
             </a:pPr>
-            <a:fld id="{2A49C9DC-282B-487B-A660-AA864D5BA54C}" type="slidenum">
+            <a:fld id="{6F2DD76F-D024-4E01-ACB0-B0C3E38B4C00}" type="slidenum">
               <a:rPr b="0" lang="en-US" sz="1400" spc="-1" strike="noStrike">
                 <a:solidFill>
                   <a:srgbClr val="ffffff"/>
@@ -8781,7 +8781,7 @@
             <a:pPr algn="r">
               <a:buNone/>
             </a:pPr>
-            <a:fld id="{AC43EFDD-FAF4-4B5B-98D5-8804E7CB995D}" type="slidenum">
+            <a:fld id="{0CEF8C10-77D9-4489-B83C-9E1E197D872A}" type="slidenum">
               <a:rPr b="0" lang="en-US" sz="1400" spc="-1" strike="noStrike">
                 <a:solidFill>
                   <a:srgbClr val="ffffff"/>
@@ -9010,7 +9010,7 @@
             <a:pPr algn="r">
               <a:buNone/>
             </a:pPr>
-            <a:fld id="{38C32ABC-635F-486A-91D6-731215EB213A}" type="slidenum">
+            <a:fld id="{59CAF1BD-665C-46F5-86A8-F665F58D5DA7}" type="slidenum">
               <a:rPr b="0" lang="en-US" sz="1400" spc="-1" strike="noStrike">
                 <a:latin typeface="Arial"/>
               </a:rPr>
@@ -9511,7 +9511,7 @@
             <a:pPr algn="r">
               <a:buNone/>
             </a:pPr>
-            <a:fld id="{0EE16E3E-8DC0-4C60-A376-28F5169438E8}" type="slidenum">
+            <a:fld id="{43BBC7BC-126A-4DB4-A71D-345B31C4D934}" type="slidenum">
               <a:rPr b="0" lang="en-US" sz="1400" spc="-1" strike="noStrike">
                 <a:latin typeface="Arial"/>
               </a:rPr>
@@ -9713,6 +9713,31 @@
           </a:ln>
         </p:spPr>
       </p:pic>
+      <p:pic>
+        <p:nvPicPr>
+          <p:cNvPr id="162" name="" descr=""/>
+          <p:cNvPicPr/>
+          <p:nvPr/>
+        </p:nvPicPr>
+        <p:blipFill>
+          <a:blip r:embed="rId2">
+            <a:alphaModFix amt="70000"/>
+          </a:blip>
+          <a:stretch/>
+        </p:blipFill>
+        <p:spPr>
+          <a:xfrm>
+            <a:off x="2553120" y="3886200"/>
+            <a:ext cx="4990680" cy="894960"/>
+          </a:xfrm>
+          <a:prstGeom prst="rect">
+            <a:avLst/>
+          </a:prstGeom>
+          <a:ln w="18000">
+            <a:noFill/>
+          </a:ln>
+        </p:spPr>
+      </p:pic>
     </p:spTree>
   </p:cSld>
   <mc:AlternateContent>
@@ -9745,7 +9770,7 @@
       </p:grpSpPr>
       <p:sp>
         <p:nvSpPr>
-          <p:cNvPr id="162" name="PlaceHolder 1"/>
+          <p:cNvPr id="163" name="PlaceHolder 1"/>
           <p:cNvSpPr>
             <a:spLocks noGrp="1"/>
           </p:cNvSpPr>
@@ -9812,7 +9837,7 @@
       </p:sp>
       <p:sp>
         <p:nvSpPr>
-          <p:cNvPr id="163" name="PlaceHolder 2"/>
+          <p:cNvPr id="164" name="PlaceHolder 2"/>
           <p:cNvSpPr>
             <a:spLocks noGrp="1"/>
           </p:cNvSpPr>
@@ -9852,7 +9877,7 @@
       </p:sp>
       <p:pic>
         <p:nvPicPr>
-          <p:cNvPr id="164" name="" descr=""/>
+          <p:cNvPr id="165" name="" descr=""/>
           <p:cNvPicPr/>
           <p:nvPr/>
         </p:nvPicPr>
@@ -9864,8 +9889,8 @@
         </p:blipFill>
         <p:spPr>
           <a:xfrm>
-            <a:off x="1600200" y="0"/>
-            <a:ext cx="7000920" cy="5669640"/>
+            <a:off x="2111760" y="360"/>
+            <a:ext cx="5889240" cy="5669640"/>
           </a:xfrm>
           <a:prstGeom prst="rect">
             <a:avLst/>
@@ -9907,7 +9932,7 @@
       </p:grpSpPr>
       <p:sp>
         <p:nvSpPr>
-          <p:cNvPr id="165" name="PlaceHolder 1"/>
+          <p:cNvPr id="166" name="PlaceHolder 1"/>
           <p:cNvSpPr>
             <a:spLocks noGrp="1"/>
           </p:cNvSpPr>
@@ -9946,55 +9971,6 @@
               <a:t>Vysledok</a:t>
             </a:r>
             <a:endParaRPr b="0" lang="en-US" sz="3300" spc="-1" strike="noStrike">
-              <a:solidFill>
-                <a:srgbClr val="ffffff"/>
-              </a:solidFill>
-              <a:latin typeface="Arial"/>
-            </a:endParaRPr>
-          </a:p>
-        </p:txBody>
-      </p:sp>
-      <p:sp>
-        <p:nvSpPr>
-          <p:cNvPr id="166" name="PlaceHolder 2"/>
-          <p:cNvSpPr>
-            <a:spLocks noGrp="1"/>
-          </p:cNvSpPr>
-          <p:nvPr>
-            <p:ph type="subTitle"/>
-          </p:nvPr>
-        </p:nvSpPr>
-        <p:spPr>
-          <a:xfrm>
-            <a:off x="5990760" y="4712760"/>
-            <a:ext cx="4089240" cy="957240"/>
-          </a:xfrm>
-          <a:prstGeom prst="rect">
-            <a:avLst/>
-          </a:prstGeom>
-          <a:noFill/>
-          <a:ln w="0">
-            <a:noFill/>
-          </a:ln>
-        </p:spPr>
-        <p:txBody>
-          <a:bodyPr lIns="0" rIns="0" tIns="0" bIns="0" anchor="ctr">
-            <a:noAutofit/>
-          </a:bodyPr>
-          <a:p>
-            <a:pPr algn="ctr">
-              <a:buNone/>
-            </a:pPr>
-            <a:r>
-              <a:rPr b="0" lang="en-US" sz="1600" spc="-1" strike="noStrike">
-                <a:solidFill>
-                  <a:srgbClr val="ffffff"/>
-                </a:solidFill>
-                <a:latin typeface="Arial"/>
-              </a:rPr>
-              <a:t>Lukas Hasprun, Peter Dvorak</a:t>
-            </a:r>
-            <a:endParaRPr b="0" lang="en-US" sz="1600" spc="-1" strike="noStrike">
               <a:solidFill>
                 <a:srgbClr val="ffffff"/>
               </a:solidFill>
@@ -10017,8 +9993,8 @@
         </p:blipFill>
         <p:spPr>
           <a:xfrm>
-            <a:off x="5734440" y="1828800"/>
-            <a:ext cx="2266560" cy="2266560"/>
+            <a:off x="2514960" y="1828800"/>
+            <a:ext cx="2285640" cy="2285640"/>
           </a:xfrm>
           <a:prstGeom prst="rect">
             <a:avLst/>
@@ -10042,8 +10018,8 @@
         </p:blipFill>
         <p:spPr>
           <a:xfrm>
-            <a:off x="2514960" y="1828800"/>
-            <a:ext cx="2285640" cy="2285640"/>
+            <a:off x="5943600" y="1828800"/>
+            <a:ext cx="2209320" cy="2209320"/>
           </a:xfrm>
           <a:prstGeom prst="rect">
             <a:avLst/>

</xml_diff>

<commit_message>
Finished th third task
</commit_message>
<xml_diff>
--- a/presentation.pptx
+++ b/presentation.pptx
@@ -69,7 +69,7 @@
         <p:txBody>
           <a:bodyPr/>
           <a:p>
-            <a:fld id="{DD803D91-450E-4E84-83C4-62586BAA5091}" type="slidenum">
+            <a:fld id="{63AB03EE-5F49-4A66-83BE-4D7C55266F2E}" type="slidenum">
               <a:t>&lt;#&gt;</a:t>
             </a:fld>
           </a:p>
@@ -263,7 +263,7 @@
         <p:txBody>
           <a:bodyPr/>
           <a:p>
-            <a:fld id="{F5E03F6C-C05C-4CF2-8D32-C0C7DB552C84}" type="slidenum">
+            <a:fld id="{65D1847C-B3B1-4335-8887-18C905A8D78C}" type="slidenum">
               <a:t>&lt;#&gt;</a:t>
             </a:fld>
           </a:p>
@@ -531,7 +531,7 @@
         <p:txBody>
           <a:bodyPr/>
           <a:p>
-            <a:fld id="{F2281AD9-E078-423E-AECE-953A777A52A3}" type="slidenum">
+            <a:fld id="{BB1FA0C4-BA1A-496F-B1EA-47FE223954EB}" type="slidenum">
               <a:t>&lt;#&gt;</a:t>
             </a:fld>
           </a:p>
@@ -873,7 +873,7 @@
         <p:txBody>
           <a:bodyPr/>
           <a:p>
-            <a:fld id="{C37AD4CF-C2AD-4BA3-B727-3EAE17BA2EE9}" type="slidenum">
+            <a:fld id="{9A6D27E4-92D6-4EEB-B1B9-D5217FBF763F}" type="slidenum">
               <a:t>&lt;#&gt;</a:t>
             </a:fld>
           </a:p>
@@ -956,7 +956,7 @@
         <p:txBody>
           <a:bodyPr/>
           <a:p>
-            <a:fld id="{796EE886-C4B3-4AE6-A777-CD4F36CBBAF8}" type="slidenum">
+            <a:fld id="{9974DAF8-4534-4E51-A094-A690DC1CAA01}" type="slidenum">
               <a:t>&lt;#&gt;</a:t>
             </a:fld>
           </a:p>
@@ -1116,7 +1116,7 @@
         <p:txBody>
           <a:bodyPr/>
           <a:p>
-            <a:fld id="{8442CE1F-58CA-4600-A98C-6D903E898186}" type="slidenum">
+            <a:fld id="{CB542E90-5D6B-4FAE-86B5-B005A7729102}" type="slidenum">
               <a:t>&lt;#&gt;</a:t>
             </a:fld>
           </a:p>
@@ -1273,7 +1273,7 @@
         <p:txBody>
           <a:bodyPr/>
           <a:p>
-            <a:fld id="{7D3100BF-27F7-403B-B7AE-C763A76AAD3F}" type="slidenum">
+            <a:fld id="{A5EB2500-6243-41D8-8BF7-EDC7838950BC}" type="slidenum">
               <a:t>&lt;#&gt;</a:t>
             </a:fld>
           </a:p>
@@ -1467,7 +1467,7 @@
         <p:txBody>
           <a:bodyPr/>
           <a:p>
-            <a:fld id="{A9E3992A-5B7D-42FC-AF44-B05F2366B045}" type="slidenum">
+            <a:fld id="{0271E76B-B81B-49AB-AF27-EEE82CCDA216}" type="slidenum">
               <a:t>&lt;#&gt;</a:t>
             </a:fld>
           </a:p>
@@ -1587,7 +1587,7 @@
         <p:txBody>
           <a:bodyPr/>
           <a:p>
-            <a:fld id="{2ADC56F5-4D4A-4362-BD15-D1BE71AA2D4F}" type="slidenum">
+            <a:fld id="{7336B007-8B96-443C-9C1C-E04B327B4782}" type="slidenum">
               <a:t>&lt;#&gt;</a:t>
             </a:fld>
           </a:p>
@@ -1710,7 +1710,7 @@
         <p:txBody>
           <a:bodyPr/>
           <a:p>
-            <a:fld id="{809C396A-3EC2-4C55-9D45-2C4A21EBE875}" type="slidenum">
+            <a:fld id="{A62816AD-4E80-4085-84D3-E1F1343797F4}" type="slidenum">
               <a:t>&lt;#&gt;</a:t>
             </a:fld>
           </a:p>
@@ -1941,7 +1941,7 @@
         <p:txBody>
           <a:bodyPr/>
           <a:p>
-            <a:fld id="{F563FFD8-DA26-4479-897C-CD66D7C2AA74}" type="slidenum">
+            <a:fld id="{28AB46E8-A2B3-4CE1-881A-FA7359A35C3D}" type="slidenum">
               <a:t>&lt;#&gt;</a:t>
             </a:fld>
           </a:p>
@@ -2101,7 +2101,7 @@
         <p:txBody>
           <a:bodyPr/>
           <a:p>
-            <a:fld id="{77D628F1-066E-45EC-978D-01B66D20D99A}" type="slidenum">
+            <a:fld id="{251952F3-6781-441C-8010-780072B01E4B}" type="slidenum">
               <a:t>&lt;#&gt;</a:t>
             </a:fld>
           </a:p>
@@ -2332,7 +2332,7 @@
         <p:txBody>
           <a:bodyPr/>
           <a:p>
-            <a:fld id="{59CC7F41-88FF-4B8E-9CE2-6CC17D00E39F}" type="slidenum">
+            <a:fld id="{821894BD-F56A-4F19-8708-DC81183E5C48}" type="slidenum">
               <a:t>&lt;#&gt;</a:t>
             </a:fld>
           </a:p>
@@ -2563,7 +2563,7 @@
         <p:txBody>
           <a:bodyPr/>
           <a:p>
-            <a:fld id="{CF54173A-17CC-4229-9308-AAA583A59E00}" type="slidenum">
+            <a:fld id="{3BB09043-C3CB-4031-9801-E32D137E57A2}" type="slidenum">
               <a:t>&lt;#&gt;</a:t>
             </a:fld>
           </a:p>
@@ -2757,7 +2757,7 @@
         <p:txBody>
           <a:bodyPr/>
           <a:p>
-            <a:fld id="{5F1B01EB-F117-47A2-9BC0-3F6C1B8D3204}" type="slidenum">
+            <a:fld id="{2B57DF57-6179-4A43-ADA8-1EB9B0DDC337}" type="slidenum">
               <a:t>&lt;#&gt;</a:t>
             </a:fld>
           </a:p>
@@ -3025,7 +3025,7 @@
         <p:txBody>
           <a:bodyPr/>
           <a:p>
-            <a:fld id="{3EC2195B-BCAA-4B97-97DF-4DCFD2062734}" type="slidenum">
+            <a:fld id="{A44B5582-070A-4E97-88F7-FB07F5053D98}" type="slidenum">
               <a:t>&lt;#&gt;</a:t>
             </a:fld>
           </a:p>
@@ -3367,7 +3367,7 @@
         <p:txBody>
           <a:bodyPr/>
           <a:p>
-            <a:fld id="{80B281C0-A93B-4DCC-A4BF-539330987BAD}" type="slidenum">
+            <a:fld id="{03658BBF-8484-4FED-9990-2CBD8A28FEFC}" type="slidenum">
               <a:t>&lt;#&gt;</a:t>
             </a:fld>
           </a:p>
@@ -3450,7 +3450,7 @@
         <p:txBody>
           <a:bodyPr/>
           <a:p>
-            <a:fld id="{A4B3E646-5BA1-4A04-9C14-13A052EB8812}" type="slidenum">
+            <a:fld id="{11257E92-435E-428B-A111-B957CE47120C}" type="slidenum">
               <a:t>&lt;#&gt;</a:t>
             </a:fld>
           </a:p>
@@ -3610,7 +3610,7 @@
         <p:txBody>
           <a:bodyPr/>
           <a:p>
-            <a:fld id="{21031292-24A6-4013-AD09-DA9B3E1684B9}" type="slidenum">
+            <a:fld id="{96CC1AAE-DCA2-4EE7-9A12-EEF831F6711E}" type="slidenum">
               <a:t>&lt;#&gt;</a:t>
             </a:fld>
           </a:p>
@@ -3767,7 +3767,7 @@
         <p:txBody>
           <a:bodyPr/>
           <a:p>
-            <a:fld id="{328D5D49-668A-49A1-ABA6-36C8997C8D43}" type="slidenum">
+            <a:fld id="{4181710A-BAA5-49D4-B4AD-23E513854846}" type="slidenum">
               <a:t>&lt;#&gt;</a:t>
             </a:fld>
           </a:p>
@@ -3961,7 +3961,7 @@
         <p:txBody>
           <a:bodyPr/>
           <a:p>
-            <a:fld id="{B03D4291-C62B-4746-833F-71212B50F784}" type="slidenum">
+            <a:fld id="{484D3E32-94C4-4E2D-97B3-97CF8CAF2E31}" type="slidenum">
               <a:t>&lt;#&gt;</a:t>
             </a:fld>
           </a:p>
@@ -4081,7 +4081,7 @@
         <p:txBody>
           <a:bodyPr/>
           <a:p>
-            <a:fld id="{BB333C83-E323-4851-AA44-7F43754D84C4}" type="slidenum">
+            <a:fld id="{5AE2167C-EAF8-4A40-A1D3-2AC48C439E05}" type="slidenum">
               <a:t>&lt;#&gt;</a:t>
             </a:fld>
           </a:p>
@@ -4238,7 +4238,7 @@
         <p:txBody>
           <a:bodyPr/>
           <a:p>
-            <a:fld id="{61FD6240-6800-40BF-A848-FF4B0A66579C}" type="slidenum">
+            <a:fld id="{374AE6FD-3DE8-4A73-90E2-1501E7399772}" type="slidenum">
               <a:t>&lt;#&gt;</a:t>
             </a:fld>
           </a:p>
@@ -4361,7 +4361,7 @@
         <p:txBody>
           <a:bodyPr/>
           <a:p>
-            <a:fld id="{BC92ED37-7252-474A-BBE2-3579589E15E4}" type="slidenum">
+            <a:fld id="{C443FD2D-2D95-4C23-8C5D-6AA31C097D6E}" type="slidenum">
               <a:t>&lt;#&gt;</a:t>
             </a:fld>
           </a:p>
@@ -4592,7 +4592,7 @@
         <p:txBody>
           <a:bodyPr/>
           <a:p>
-            <a:fld id="{24F87C19-B036-4900-B409-8A4AB9D2FC9D}" type="slidenum">
+            <a:fld id="{AABD6E7C-4AAC-4507-8A28-85D25E4C2D5D}" type="slidenum">
               <a:t>&lt;#&gt;</a:t>
             </a:fld>
           </a:p>
@@ -4823,7 +4823,7 @@
         <p:txBody>
           <a:bodyPr/>
           <a:p>
-            <a:fld id="{73397970-1C28-48CB-A1B9-148D0A8E2CD6}" type="slidenum">
+            <a:fld id="{3C41A019-1C12-49F5-B0BB-44144B193249}" type="slidenum">
               <a:t>&lt;#&gt;</a:t>
             </a:fld>
           </a:p>
@@ -5054,7 +5054,7 @@
         <p:txBody>
           <a:bodyPr/>
           <a:p>
-            <a:fld id="{38D2A188-1009-47AB-9AA8-8CFC46E4B954}" type="slidenum">
+            <a:fld id="{9B83653E-D894-4169-9C78-672E87E340F0}" type="slidenum">
               <a:t>&lt;#&gt;</a:t>
             </a:fld>
           </a:p>
@@ -5248,7 +5248,7 @@
         <p:txBody>
           <a:bodyPr/>
           <a:p>
-            <a:fld id="{58B8AEFF-8F71-4610-9EDC-3BDDCEBB4D6C}" type="slidenum">
+            <a:fld id="{5BB441EE-7086-4B0B-BF84-EF1C39ACB495}" type="slidenum">
               <a:t>&lt;#&gt;</a:t>
             </a:fld>
           </a:p>
@@ -5516,7 +5516,7 @@
         <p:txBody>
           <a:bodyPr/>
           <a:p>
-            <a:fld id="{0F8CEF9D-D11C-47C5-AD2E-4A4301C78D86}" type="slidenum">
+            <a:fld id="{0D52DC61-9028-4D18-B2E8-D8A806121989}" type="slidenum">
               <a:t>&lt;#&gt;</a:t>
             </a:fld>
           </a:p>
@@ -5858,7 +5858,7 @@
         <p:txBody>
           <a:bodyPr/>
           <a:p>
-            <a:fld id="{EF82A54D-B70D-4DAA-B203-EC8399096A34}" type="slidenum">
+            <a:fld id="{FB2F5135-E2EC-41FF-B341-29149D63177D}" type="slidenum">
               <a:t>&lt;#&gt;</a:t>
             </a:fld>
           </a:p>
@@ -6052,7 +6052,7 @@
         <p:txBody>
           <a:bodyPr/>
           <a:p>
-            <a:fld id="{072D0E66-C94A-47F1-A584-B05FC03C5D1E}" type="slidenum">
+            <a:fld id="{51D776CC-FA0B-4B97-9A29-0E76EE7C2204}" type="slidenum">
               <a:t>&lt;#&gt;</a:t>
             </a:fld>
           </a:p>
@@ -6172,7 +6172,7 @@
         <p:txBody>
           <a:bodyPr/>
           <a:p>
-            <a:fld id="{05CE5010-B314-48F1-8CFC-5C4C9E561F32}" type="slidenum">
+            <a:fld id="{C76B4F22-907E-433D-9809-8318CE265FBA}" type="slidenum">
               <a:t>&lt;#&gt;</a:t>
             </a:fld>
           </a:p>
@@ -6295,7 +6295,7 @@
         <p:txBody>
           <a:bodyPr/>
           <a:p>
-            <a:fld id="{878DC08B-FD00-4C49-BF94-8B0F457241DD}" type="slidenum">
+            <a:fld id="{5FFCB995-596A-4542-A297-61722171C3B8}" type="slidenum">
               <a:t>&lt;#&gt;</a:t>
             </a:fld>
           </a:p>
@@ -6526,7 +6526,7 @@
         <p:txBody>
           <a:bodyPr/>
           <a:p>
-            <a:fld id="{B579DE49-FE87-466F-92E1-7DE581D21CFF}" type="slidenum">
+            <a:fld id="{D20AB59E-46C6-4196-801F-369CFA902F3D}" type="slidenum">
               <a:t>&lt;#&gt;</a:t>
             </a:fld>
           </a:p>
@@ -6757,7 +6757,7 @@
         <p:txBody>
           <a:bodyPr/>
           <a:p>
-            <a:fld id="{E253C86E-1160-4BB2-BDB4-E5E06BE8B71F}" type="slidenum">
+            <a:fld id="{490A1FBF-B302-4E61-B557-4EA5624E9E55}" type="slidenum">
               <a:t>&lt;#&gt;</a:t>
             </a:fld>
           </a:p>
@@ -6988,7 +6988,7 @@
         <p:txBody>
           <a:bodyPr/>
           <a:p>
-            <a:fld id="{8284D324-8273-43B8-937A-3197FCE6D7D5}" type="slidenum">
+            <a:fld id="{E8D8D638-4B30-4913-831F-1C1DE47FDA1D}" type="slidenum">
               <a:t>&lt;#&gt;</a:t>
             </a:fld>
           </a:p>
@@ -7502,7 +7502,7 @@
             <a:pPr algn="r">
               <a:buNone/>
             </a:pPr>
-            <a:fld id="{9D34265E-8AC0-48D8-AD38-B0E8C555CA06}" type="slidenum">
+            <a:fld id="{AE610844-F905-4E4C-B571-23394B1F8114}" type="slidenum">
               <a:rPr b="0" lang="en-US" sz="1400" spc="-1" strike="noStrike">
                 <a:solidFill>
                   <a:srgbClr val="ffffff"/>
@@ -8039,7 +8039,7 @@
             <a:pPr algn="r">
               <a:buNone/>
             </a:pPr>
-            <a:fld id="{6F2DD76F-D024-4E01-ACB0-B0C3E38B4C00}" type="slidenum">
+            <a:fld id="{50AE7329-BBAB-4D49-971F-4AF7A6E0DD8F}" type="slidenum">
               <a:rPr b="0" lang="en-US" sz="1400" spc="-1" strike="noStrike">
                 <a:solidFill>
                   <a:srgbClr val="ffffff"/>
@@ -8781,7 +8781,7 @@
             <a:pPr algn="r">
               <a:buNone/>
             </a:pPr>
-            <a:fld id="{0CEF8C10-77D9-4489-B83C-9E1E197D872A}" type="slidenum">
+            <a:fld id="{0FB314F0-7DF8-4D4A-9E24-3F2E3E515860}" type="slidenum">
               <a:rPr b="0" lang="en-US" sz="1400" spc="-1" strike="noStrike">
                 <a:solidFill>
                   <a:srgbClr val="ffffff"/>
@@ -9010,7 +9010,7 @@
             <a:pPr algn="r">
               <a:buNone/>
             </a:pPr>
-            <a:fld id="{59CAF1BD-665C-46F5-86A8-F665F58D5DA7}" type="slidenum">
+            <a:fld id="{BDCE90E0-0619-4846-91F6-153257D5C516}" type="slidenum">
               <a:rPr b="0" lang="en-US" sz="1400" spc="-1" strike="noStrike">
                 <a:latin typeface="Arial"/>
               </a:rPr>
@@ -9511,7 +9511,7 @@
             <a:pPr algn="r">
               <a:buNone/>
             </a:pPr>
-            <a:fld id="{43BBC7BC-126A-4DB4-A71D-345B31C4D934}" type="slidenum">
+            <a:fld id="{712EBB49-997A-4A5F-A9BE-6C232C4BFCC2}" type="slidenum">
               <a:rPr b="0" lang="en-US" sz="1400" spc="-1" strike="noStrike">
                 <a:latin typeface="Arial"/>
               </a:rPr>
@@ -9889,8 +9889,8 @@
         </p:blipFill>
         <p:spPr>
           <a:xfrm>
-            <a:off x="2111760" y="360"/>
-            <a:ext cx="5889240" cy="5669640"/>
+            <a:off x="2057400" y="0"/>
+            <a:ext cx="6424920" cy="5669640"/>
           </a:xfrm>
           <a:prstGeom prst="rect">
             <a:avLst/>
@@ -9993,33 +9993,8 @@
         </p:blipFill>
         <p:spPr>
           <a:xfrm>
-            <a:off x="2514960" y="1828800"/>
-            <a:ext cx="2285640" cy="2285640"/>
-          </a:xfrm>
-          <a:prstGeom prst="rect">
-            <a:avLst/>
-          </a:prstGeom>
-          <a:ln w="18000">
-            <a:noFill/>
-          </a:ln>
-        </p:spPr>
-      </p:pic>
-      <p:pic>
-        <p:nvPicPr>
-          <p:cNvPr id="168" name="" descr=""/>
-          <p:cNvPicPr/>
-          <p:nvPr/>
-        </p:nvPicPr>
-        <p:blipFill>
-          <a:blip r:embed="rId2">
-            <a:alphaModFix amt="70000"/>
-          </a:blip>
-          <a:stretch/>
-        </p:blipFill>
-        <p:spPr>
-          <a:xfrm>
-            <a:off x="5943600" y="1828800"/>
-            <a:ext cx="2209320" cy="2209320"/>
+            <a:off x="2762640" y="1600200"/>
+            <a:ext cx="4552560" cy="2647440"/>
           </a:xfrm>
           <a:prstGeom prst="rect">
             <a:avLst/>
@@ -10061,7 +10036,7 @@
       </p:grpSpPr>
       <p:sp>
         <p:nvSpPr>
-          <p:cNvPr id="169" name="PlaceHolder 1"/>
+          <p:cNvPr id="168" name="PlaceHolder 1"/>
           <p:cNvSpPr>
             <a:spLocks noGrp="1"/>
           </p:cNvSpPr>
@@ -10110,7 +10085,7 @@
       </p:sp>
       <p:sp>
         <p:nvSpPr>
-          <p:cNvPr id="170" name="PlaceHolder 2"/>
+          <p:cNvPr id="169" name="PlaceHolder 2"/>
           <p:cNvSpPr>
             <a:spLocks noGrp="1"/>
           </p:cNvSpPr>

</xml_diff>